<commit_message>
added template to folienmaster
</commit_message>
<xml_diff>
--- a/defense/praktikum_defense.pptx
+++ b/defense/praktikum_defense.pptx
@@ -2252,6 +2252,294 @@
 
 <file path=ppt/slideLayouts/slideLayout10.xml><?xml version="1.0" encoding="utf-8"?>
 <p:sldLayout xmlns:a="http://schemas.openxmlformats.org/drawingml/2006/main" xmlns:r="http://schemas.openxmlformats.org/officeDocument/2006/relationships" xmlns:p="http://schemas.openxmlformats.org/presentationml/2006/main" xmlns:m="http://schemas.openxmlformats.org/officeDocument/2006/math" xmlns:w="http://schemas.openxmlformats.org/wordprocessingml/2006/main" matchingName="" preserve="1" showMasterPhAnim="0" showMasterSp="1" userDrawn="1">
+  <p:cSld name="Erfenschlag">
+    <p:spTree>
+      <p:nvGrpSpPr>
+        <p:cNvPr id="1" name=""/>
+        <p:cNvGrpSpPr/>
+        <p:nvPr/>
+      </p:nvGrpSpPr>
+      <p:grpSpPr bwMode="auto">
+        <a:xfrm>
+          <a:off x="0" y="0"/>
+          <a:ext cx="0" cy="0"/>
+          <a:chOff x="0" y="0"/>
+          <a:chExt cx="0" cy="0"/>
+        </a:xfrm>
+      </p:grpSpPr>
+      <p:sp>
+        <p:nvSpPr>
+          <p:cNvPr id="4" name="Titel 3"/>
+          <p:cNvSpPr>
+            <a:spLocks noGrp="1"/>
+          </p:cNvSpPr>
+          <p:nvPr>
+            <p:ph type="title" hasCustomPrompt="1"/>
+          </p:nvPr>
+        </p:nvSpPr>
+        <p:spPr bwMode="auto">
+          <a:xfrm>
+            <a:off x="1343025" y="152400"/>
+            <a:ext cx="10656888" cy="468314"/>
+          </a:xfrm>
+          <a:prstGeom prst="rect">
+            <a:avLst/>
+          </a:prstGeom>
+        </p:spPr>
+        <p:txBody>
+          <a:bodyPr lIns="0" tIns="0" rIns="0" bIns="0">
+            <a:normAutofit/>
+          </a:bodyPr>
+          <a:lstStyle>
+            <a:lvl1pPr>
+              <a:defRPr sz="2800"/>
+            </a:lvl1pPr>
+          </a:lstStyle>
+          <a:p>
+            <a:pPr>
+              <a:defRPr/>
+            </a:pPr>
+            <a:r>
+              <a:rPr lang="de-DE"/>
+              <a:t>Titelmasterformat durch Klicken bearbeiten</a:t>
+            </a:r>
+            <a:endParaRPr/>
+          </a:p>
+        </p:txBody>
+      </p:sp>
+      <p:sp>
+        <p:nvSpPr>
+          <p:cNvPr id="6" name="Bildplatzhalter 4"/>
+          <p:cNvSpPr>
+            <a:spLocks noGrp="1"/>
+          </p:cNvSpPr>
+          <p:nvPr>
+            <p:ph type="pic" sz="quarter" idx="12" hasCustomPrompt="1"/>
+          </p:nvPr>
+        </p:nvSpPr>
+        <p:spPr bwMode="auto">
+          <a:xfrm>
+            <a:off x="192088" y="908050"/>
+            <a:ext cx="790576" cy="928370"/>
+          </a:xfrm>
+          <a:prstGeom prst="rect">
+            <a:avLst/>
+          </a:prstGeom>
+        </p:spPr>
+        <p:txBody>
+          <a:bodyPr anchor="b">
+            <a:noAutofit/>
+          </a:bodyPr>
+          <a:lstStyle>
+            <a:lvl1pPr marL="0" indent="0" algn="ctr">
+              <a:buNone/>
+              <a:defRPr sz="2000">
+                <a:latin typeface="Roboto"/>
+                <a:ea typeface="Roboto"/>
+              </a:defRPr>
+            </a:lvl1pPr>
+          </a:lstStyle>
+          <a:p>
+            <a:pPr>
+              <a:defRPr/>
+            </a:pPr>
+            <a:r>
+              <a:rPr lang="de-DE"/>
+              <a:t>Logo</a:t>
+            </a:r>
+            <a:endParaRPr/>
+          </a:p>
+        </p:txBody>
+      </p:sp>
+      <p:sp>
+        <p:nvSpPr>
+          <p:cNvPr id="12" name="Textplatzhalter 7"/>
+          <p:cNvSpPr>
+            <a:spLocks noGrp="1"/>
+          </p:cNvSpPr>
+          <p:nvPr>
+            <p:ph type="body" sz="quarter" idx="13" hasCustomPrompt="1"/>
+          </p:nvPr>
+        </p:nvSpPr>
+        <p:spPr bwMode="auto">
+          <a:xfrm>
+            <a:off x="1558925" y="908050"/>
+            <a:ext cx="10440988" cy="928370"/>
+          </a:xfrm>
+          <a:prstGeom prst="rect">
+            <a:avLst/>
+          </a:prstGeom>
+        </p:spPr>
+        <p:txBody>
+          <a:bodyPr lIns="0" tIns="0" rIns="0" bIns="0">
+            <a:normAutofit/>
+          </a:bodyPr>
+          <a:lstStyle>
+            <a:lvl1pPr marL="0" indent="0">
+              <a:buFont typeface="Arial"/>
+              <a:buNone/>
+              <a:defRPr sz="2400" b="1">
+                <a:solidFill>
+                  <a:schemeClr val="tx1"/>
+                </a:solidFill>
+                <a:latin typeface="Roboto"/>
+                <a:ea typeface="Roboto"/>
+              </a:defRPr>
+            </a:lvl1pPr>
+            <a:lvl2pPr>
+              <a:defRPr sz="2400">
+                <a:latin typeface="Roboto"/>
+                <a:ea typeface="Roboto"/>
+              </a:defRPr>
+            </a:lvl2pPr>
+            <a:lvl3pPr>
+              <a:defRPr sz="2000">
+                <a:latin typeface="Roboto"/>
+                <a:ea typeface="Roboto"/>
+              </a:defRPr>
+            </a:lvl3pPr>
+            <a:lvl4pPr>
+              <a:defRPr sz="2000">
+                <a:latin typeface="Roboto"/>
+                <a:ea typeface="Roboto"/>
+              </a:defRPr>
+            </a:lvl4pPr>
+            <a:lvl5pPr>
+              <a:defRPr sz="2000">
+                <a:latin typeface="Roboto"/>
+                <a:ea typeface="Roboto"/>
+              </a:defRPr>
+            </a:lvl5pPr>
+          </a:lstStyle>
+          <a:p>
+            <a:pPr lvl="0">
+              <a:defRPr/>
+            </a:pPr>
+            <a:r>
+              <a:rPr lang="de-DE"/>
+              <a:t>Textmasterformat bearbeiten</a:t>
+            </a:r>
+            <a:endParaRPr/>
+          </a:p>
+        </p:txBody>
+      </p:sp>
+      <p:sp>
+        <p:nvSpPr>
+          <p:cNvPr id="8" name="Textplatzhalter 7"/>
+          <p:cNvSpPr>
+            <a:spLocks noGrp="1"/>
+          </p:cNvSpPr>
+          <p:nvPr>
+            <p:ph type="body" sz="quarter" idx="11"/>
+          </p:nvPr>
+        </p:nvSpPr>
+        <p:spPr bwMode="auto">
+          <a:xfrm>
+            <a:off x="1558925" y="1996440"/>
+            <a:ext cx="10440988" cy="4348798"/>
+          </a:xfrm>
+          <a:prstGeom prst="rect">
+            <a:avLst/>
+          </a:prstGeom>
+        </p:spPr>
+        <p:txBody>
+          <a:bodyPr>
+            <a:normAutofit/>
+          </a:bodyPr>
+          <a:lstStyle>
+            <a:lvl1pPr>
+              <a:defRPr sz="2800">
+                <a:latin typeface="Roboto"/>
+                <a:ea typeface="Roboto"/>
+              </a:defRPr>
+            </a:lvl1pPr>
+            <a:lvl2pPr>
+              <a:defRPr sz="2400">
+                <a:latin typeface="Roboto"/>
+                <a:ea typeface="Roboto"/>
+              </a:defRPr>
+            </a:lvl2pPr>
+            <a:lvl3pPr>
+              <a:defRPr sz="2000">
+                <a:latin typeface="Roboto"/>
+                <a:ea typeface="Roboto"/>
+              </a:defRPr>
+            </a:lvl3pPr>
+            <a:lvl4pPr>
+              <a:defRPr sz="2000">
+                <a:latin typeface="Roboto"/>
+                <a:ea typeface="Roboto"/>
+              </a:defRPr>
+            </a:lvl4pPr>
+            <a:lvl5pPr>
+              <a:defRPr sz="2000">
+                <a:latin typeface="Roboto"/>
+                <a:ea typeface="Roboto"/>
+              </a:defRPr>
+            </a:lvl5pPr>
+          </a:lstStyle>
+          <a:p>
+            <a:pPr lvl="0">
+              <a:defRPr/>
+            </a:pPr>
+            <a:r>
+              <a:rPr lang="de-DE"/>
+              <a:t>Textmasterformat bearbeiten</a:t>
+            </a:r>
+            <a:endParaRPr/>
+          </a:p>
+          <a:p>
+            <a:pPr lvl="1">
+              <a:defRPr/>
+            </a:pPr>
+            <a:r>
+              <a:rPr lang="de-DE"/>
+              <a:t>Zweite Ebene</a:t>
+            </a:r>
+            <a:endParaRPr/>
+          </a:p>
+          <a:p>
+            <a:pPr lvl="2">
+              <a:defRPr/>
+            </a:pPr>
+            <a:r>
+              <a:rPr lang="de-DE"/>
+              <a:t>Dritte Ebene</a:t>
+            </a:r>
+            <a:endParaRPr/>
+          </a:p>
+          <a:p>
+            <a:pPr lvl="3">
+              <a:defRPr/>
+            </a:pPr>
+            <a:r>
+              <a:rPr lang="de-DE"/>
+              <a:t>Vierte Ebene</a:t>
+            </a:r>
+            <a:endParaRPr/>
+          </a:p>
+          <a:p>
+            <a:pPr lvl="4">
+              <a:defRPr/>
+            </a:pPr>
+            <a:r>
+              <a:rPr lang="de-DE"/>
+              <a:t>Fünfte Ebene</a:t>
+            </a:r>
+            <a:endParaRPr/>
+          </a:p>
+        </p:txBody>
+      </p:sp>
+    </p:spTree>
+  </p:cSld>
+  <p:clrMapOvr>
+    <a:masterClrMapping/>
+  </p:clrMapOvr>
+</p:sldLayout>
+</file>
+
+<file path=ppt/slideLayouts/slideLayout11.xml><?xml version="1.0" encoding="utf-8"?>
+<p:sldLayout xmlns:a="http://schemas.openxmlformats.org/drawingml/2006/main" xmlns:r="http://schemas.openxmlformats.org/officeDocument/2006/relationships" xmlns:p="http://schemas.openxmlformats.org/presentationml/2006/main" xmlns:m="http://schemas.openxmlformats.org/officeDocument/2006/math" xmlns:w="http://schemas.openxmlformats.org/wordprocessingml/2006/main" matchingName="" preserve="1" showMasterPhAnim="0" showMasterSp="1" userDrawn="1">
   <p:cSld name="Gablenz">
     <p:spTree>
       <p:nvGrpSpPr>
@@ -4238,6 +4526,292 @@
 </file>
 
 <file path=ppt/slideLayouts/slideLayout7.xml><?xml version="1.0" encoding="utf-8"?>
+<p:sldLayout xmlns:a="http://schemas.openxmlformats.org/drawingml/2006/main" xmlns:r="http://schemas.openxmlformats.org/officeDocument/2006/relationships" xmlns:p="http://schemas.openxmlformats.org/presentationml/2006/main" xmlns:m="http://schemas.openxmlformats.org/officeDocument/2006/math" xmlns:w="http://schemas.openxmlformats.org/wordprocessingml/2006/main" matchingName="" preserve="0" showMasterPhAnim="0" showMasterSp="1" userDrawn="1">
+  <p:cSld name="Euba">
+    <p:spTree>
+      <p:nvGrpSpPr>
+        <p:cNvPr id="1" name=""/>
+        <p:cNvGrpSpPr/>
+        <p:nvPr/>
+      </p:nvGrpSpPr>
+      <p:grpSpPr bwMode="auto">
+        <a:xfrm>
+          <a:off x="0" y="0"/>
+          <a:ext cx="0" cy="0"/>
+          <a:chOff x="0" y="0"/>
+          <a:chExt cx="0" cy="0"/>
+        </a:xfrm>
+      </p:grpSpPr>
+      <p:sp>
+        <p:nvSpPr>
+          <p:cNvPr id="1172015715" name="Titel 3"/>
+          <p:cNvSpPr>
+            <a:spLocks noGrp="1"/>
+          </p:cNvSpPr>
+          <p:nvPr>
+            <p:ph type="title" hasCustomPrompt="1"/>
+          </p:nvPr>
+        </p:nvSpPr>
+        <p:spPr bwMode="auto">
+          <a:xfrm>
+            <a:off x="1343025" y="152399"/>
+            <a:ext cx="10656887" cy="468313"/>
+          </a:xfrm>
+          <a:prstGeom prst="rect">
+            <a:avLst/>
+          </a:prstGeom>
+        </p:spPr>
+        <p:txBody>
+          <a:bodyPr lIns="0" tIns="0" rIns="0" bIns="0">
+            <a:normAutofit/>
+          </a:bodyPr>
+          <a:lstStyle>
+            <a:lvl1pPr>
+              <a:defRPr sz="2800"/>
+            </a:lvl1pPr>
+          </a:lstStyle>
+          <a:p>
+            <a:pPr>
+              <a:defRPr/>
+            </a:pPr>
+            <a:r>
+              <a:rPr lang="de-DE"/>
+              <a:t>Titelmasterformat durch Klicken bearbeiten</a:t>
+            </a:r>
+            <a:endParaRPr/>
+          </a:p>
+        </p:txBody>
+      </p:sp>
+      <p:sp>
+        <p:nvSpPr>
+          <p:cNvPr id="719331652" name="Textplatzhalter 7"/>
+          <p:cNvSpPr>
+            <a:spLocks noGrp="1"/>
+          </p:cNvSpPr>
+          <p:nvPr>
+            <p:ph type="body" sz="quarter" idx="13" hasCustomPrompt="1"/>
+          </p:nvPr>
+        </p:nvSpPr>
+        <p:spPr bwMode="auto">
+          <a:xfrm>
+            <a:off x="192087" y="908049"/>
+            <a:ext cx="11807824" cy="928369"/>
+          </a:xfrm>
+          <a:prstGeom prst="rect">
+            <a:avLst/>
+          </a:prstGeom>
+        </p:spPr>
+        <p:txBody>
+          <a:bodyPr lIns="0" tIns="0" rIns="0" bIns="0">
+            <a:normAutofit/>
+          </a:bodyPr>
+          <a:lstStyle>
+            <a:lvl1pPr marL="0" indent="0">
+              <a:buFont typeface="Arial"/>
+              <a:buNone/>
+              <a:defRPr sz="2400" b="1">
+                <a:solidFill>
+                  <a:schemeClr val="tx1"/>
+                </a:solidFill>
+                <a:latin typeface="Roboto"/>
+                <a:ea typeface="Roboto"/>
+              </a:defRPr>
+            </a:lvl1pPr>
+            <a:lvl2pPr>
+              <a:defRPr sz="2400">
+                <a:latin typeface="Roboto"/>
+                <a:ea typeface="Roboto"/>
+              </a:defRPr>
+            </a:lvl2pPr>
+            <a:lvl3pPr>
+              <a:defRPr sz="2000">
+                <a:latin typeface="Roboto"/>
+                <a:ea typeface="Roboto"/>
+              </a:defRPr>
+            </a:lvl3pPr>
+            <a:lvl4pPr>
+              <a:defRPr sz="2000">
+                <a:latin typeface="Roboto"/>
+                <a:ea typeface="Roboto"/>
+              </a:defRPr>
+            </a:lvl4pPr>
+            <a:lvl5pPr>
+              <a:defRPr sz="2000">
+                <a:latin typeface="Roboto"/>
+                <a:ea typeface="Roboto"/>
+              </a:defRPr>
+            </a:lvl5pPr>
+          </a:lstStyle>
+          <a:p>
+            <a:pPr lvl="0">
+              <a:defRPr/>
+            </a:pPr>
+            <a:r>
+              <a:rPr lang="de-DE"/>
+              <a:t>Textmasterformat bearbeiten</a:t>
+            </a:r>
+            <a:endParaRPr/>
+          </a:p>
+        </p:txBody>
+      </p:sp>
+      <p:sp>
+        <p:nvSpPr>
+          <p:cNvPr id="1331812975" name="Bildplatzhalter 2"/>
+          <p:cNvSpPr>
+            <a:spLocks noGrp="1"/>
+          </p:cNvSpPr>
+          <p:nvPr>
+            <p:ph type="pic" sz="quarter" idx="10"/>
+          </p:nvPr>
+        </p:nvSpPr>
+        <p:spPr bwMode="auto">
+          <a:xfrm>
+            <a:off x="6203949" y="2060574"/>
+            <a:ext cx="5795961" cy="4284662"/>
+          </a:xfrm>
+          <a:prstGeom prst="rect">
+            <a:avLst/>
+          </a:prstGeom>
+        </p:spPr>
+        <p:txBody>
+          <a:bodyPr anchor="b" anchorCtr="0"/>
+          <a:lstStyle>
+            <a:lvl1pPr marL="0" indent="0" algn="ctr">
+              <a:buNone/>
+              <a:defRPr sz="2000">
+                <a:latin typeface="Roboto"/>
+                <a:ea typeface="Roboto"/>
+              </a:defRPr>
+            </a:lvl1pPr>
+          </a:lstStyle>
+          <a:p>
+            <a:pPr>
+              <a:defRPr/>
+            </a:pPr>
+            <a:r>
+              <a:rPr lang="de-DE"/>
+              <a:t>Bild durch Klicken auf Symbol hinzufügen</a:t>
+            </a:r>
+            <a:endParaRPr/>
+          </a:p>
+        </p:txBody>
+      </p:sp>
+      <p:sp>
+        <p:nvSpPr>
+          <p:cNvPr id="493925108" name="Textplatzhalter 7"/>
+          <p:cNvSpPr>
+            <a:spLocks noGrp="1"/>
+          </p:cNvSpPr>
+          <p:nvPr>
+            <p:ph type="body" sz="quarter" idx="11"/>
+          </p:nvPr>
+        </p:nvSpPr>
+        <p:spPr bwMode="auto">
+          <a:xfrm>
+            <a:off x="192087" y="2060574"/>
+            <a:ext cx="5795962" cy="4284662"/>
+          </a:xfrm>
+          <a:prstGeom prst="rect">
+            <a:avLst/>
+          </a:prstGeom>
+        </p:spPr>
+        <p:txBody>
+          <a:bodyPr>
+            <a:normAutofit/>
+          </a:bodyPr>
+          <a:lstStyle>
+            <a:lvl1pPr>
+              <a:defRPr sz="2800">
+                <a:latin typeface="Roboto"/>
+                <a:ea typeface="Roboto"/>
+              </a:defRPr>
+            </a:lvl1pPr>
+            <a:lvl2pPr>
+              <a:defRPr sz="2400">
+                <a:latin typeface="Roboto"/>
+                <a:ea typeface="Roboto"/>
+              </a:defRPr>
+            </a:lvl2pPr>
+            <a:lvl3pPr>
+              <a:defRPr sz="2000">
+                <a:latin typeface="Roboto"/>
+                <a:ea typeface="Roboto"/>
+              </a:defRPr>
+            </a:lvl3pPr>
+            <a:lvl4pPr>
+              <a:defRPr sz="2000">
+                <a:latin typeface="Roboto"/>
+                <a:ea typeface="Roboto"/>
+              </a:defRPr>
+            </a:lvl4pPr>
+            <a:lvl5pPr>
+              <a:defRPr sz="2000">
+                <a:latin typeface="Roboto"/>
+                <a:ea typeface="Roboto"/>
+              </a:defRPr>
+            </a:lvl5pPr>
+          </a:lstStyle>
+          <a:p>
+            <a:pPr lvl="0">
+              <a:defRPr/>
+            </a:pPr>
+            <a:r>
+              <a:rPr lang="de-DE"/>
+              <a:t>Textmasterformat bearbeiten</a:t>
+            </a:r>
+            <a:endParaRPr/>
+          </a:p>
+          <a:p>
+            <a:pPr lvl="1">
+              <a:defRPr/>
+            </a:pPr>
+            <a:r>
+              <a:rPr lang="de-DE"/>
+              <a:t>Zweite Ebene</a:t>
+            </a:r>
+            <a:endParaRPr/>
+          </a:p>
+          <a:p>
+            <a:pPr lvl="2">
+              <a:defRPr/>
+            </a:pPr>
+            <a:r>
+              <a:rPr lang="de-DE"/>
+              <a:t>Dritte Ebene</a:t>
+            </a:r>
+            <a:endParaRPr/>
+          </a:p>
+          <a:p>
+            <a:pPr lvl="3">
+              <a:defRPr/>
+            </a:pPr>
+            <a:r>
+              <a:rPr lang="de-DE"/>
+              <a:t>Vierte Ebene</a:t>
+            </a:r>
+            <a:endParaRPr/>
+          </a:p>
+          <a:p>
+            <a:pPr lvl="4">
+              <a:defRPr/>
+            </a:pPr>
+            <a:r>
+              <a:rPr lang="de-DE"/>
+              <a:t>Fünfte Ebene</a:t>
+            </a:r>
+            <a:endParaRPr/>
+          </a:p>
+        </p:txBody>
+      </p:sp>
+    </p:spTree>
+  </p:cSld>
+  <p:clrMapOvr>
+    <a:masterClrMapping/>
+  </p:clrMapOvr>
+</p:sldLayout>
+</file>
+
+<file path=ppt/slideLayouts/slideLayout8.xml><?xml version="1.0" encoding="utf-8"?>
 <p:sldLayout xmlns:a="http://schemas.openxmlformats.org/drawingml/2006/main" xmlns:r="http://schemas.openxmlformats.org/officeDocument/2006/relationships" xmlns:p="http://schemas.openxmlformats.org/presentationml/2006/main" xmlns:m="http://schemas.openxmlformats.org/officeDocument/2006/math" xmlns:w="http://schemas.openxmlformats.org/wordprocessingml/2006/main" matchingName="" preserve="1" showMasterPhAnim="0" showMasterSp="1" userDrawn="1">
   <p:cSld name="Einsiedel">
     <p:spTree>
@@ -4612,7 +5186,7 @@
 </p:sldLayout>
 </file>
 
-<file path=ppt/slideLayouts/slideLayout8.xml><?xml version="1.0" encoding="utf-8"?>
+<file path=ppt/slideLayouts/slideLayout9.xml><?xml version="1.0" encoding="utf-8"?>
 <p:sldLayout xmlns:a="http://schemas.openxmlformats.org/drawingml/2006/main" xmlns:r="http://schemas.openxmlformats.org/officeDocument/2006/relationships" xmlns:p="http://schemas.openxmlformats.org/presentationml/2006/main" xmlns:m="http://schemas.openxmlformats.org/officeDocument/2006/math" xmlns:w="http://schemas.openxmlformats.org/wordprocessingml/2006/main" matchingName="" preserve="1" showMasterPhAnim="0" showMasterSp="1" userDrawn="1">
   <p:cSld name="Rabenstein">
     <p:spTree>
@@ -4815,294 +5389,6 @@
             </a:lvl1pPr>
             <a:lvl2pPr>
               <a:defRPr sz="2000">
-                <a:latin typeface="Roboto"/>
-                <a:ea typeface="Roboto"/>
-              </a:defRPr>
-            </a:lvl2pPr>
-            <a:lvl3pPr>
-              <a:defRPr sz="2000">
-                <a:latin typeface="Roboto"/>
-                <a:ea typeface="Roboto"/>
-              </a:defRPr>
-            </a:lvl3pPr>
-            <a:lvl4pPr>
-              <a:defRPr sz="2000">
-                <a:latin typeface="Roboto"/>
-                <a:ea typeface="Roboto"/>
-              </a:defRPr>
-            </a:lvl4pPr>
-            <a:lvl5pPr>
-              <a:defRPr sz="2000">
-                <a:latin typeface="Roboto"/>
-                <a:ea typeface="Roboto"/>
-              </a:defRPr>
-            </a:lvl5pPr>
-          </a:lstStyle>
-          <a:p>
-            <a:pPr lvl="0">
-              <a:defRPr/>
-            </a:pPr>
-            <a:r>
-              <a:rPr lang="de-DE"/>
-              <a:t>Textmasterformat bearbeiten</a:t>
-            </a:r>
-            <a:endParaRPr/>
-          </a:p>
-          <a:p>
-            <a:pPr lvl="1">
-              <a:defRPr/>
-            </a:pPr>
-            <a:r>
-              <a:rPr lang="de-DE"/>
-              <a:t>Zweite Ebene</a:t>
-            </a:r>
-            <a:endParaRPr/>
-          </a:p>
-          <a:p>
-            <a:pPr lvl="2">
-              <a:defRPr/>
-            </a:pPr>
-            <a:r>
-              <a:rPr lang="de-DE"/>
-              <a:t>Dritte Ebene</a:t>
-            </a:r>
-            <a:endParaRPr/>
-          </a:p>
-          <a:p>
-            <a:pPr lvl="3">
-              <a:defRPr/>
-            </a:pPr>
-            <a:r>
-              <a:rPr lang="de-DE"/>
-              <a:t>Vierte Ebene</a:t>
-            </a:r>
-            <a:endParaRPr/>
-          </a:p>
-          <a:p>
-            <a:pPr lvl="4">
-              <a:defRPr/>
-            </a:pPr>
-            <a:r>
-              <a:rPr lang="de-DE"/>
-              <a:t>Fünfte Ebene</a:t>
-            </a:r>
-            <a:endParaRPr/>
-          </a:p>
-        </p:txBody>
-      </p:sp>
-    </p:spTree>
-  </p:cSld>
-  <p:clrMapOvr>
-    <a:masterClrMapping/>
-  </p:clrMapOvr>
-</p:sldLayout>
-</file>
-
-<file path=ppt/slideLayouts/slideLayout9.xml><?xml version="1.0" encoding="utf-8"?>
-<p:sldLayout xmlns:a="http://schemas.openxmlformats.org/drawingml/2006/main" xmlns:r="http://schemas.openxmlformats.org/officeDocument/2006/relationships" xmlns:p="http://schemas.openxmlformats.org/presentationml/2006/main" xmlns:m="http://schemas.openxmlformats.org/officeDocument/2006/math" xmlns:w="http://schemas.openxmlformats.org/wordprocessingml/2006/main" matchingName="" preserve="1" showMasterPhAnim="0" showMasterSp="1" userDrawn="1">
-  <p:cSld name="Erfenschlag">
-    <p:spTree>
-      <p:nvGrpSpPr>
-        <p:cNvPr id="1" name=""/>
-        <p:cNvGrpSpPr/>
-        <p:nvPr/>
-      </p:nvGrpSpPr>
-      <p:grpSpPr bwMode="auto">
-        <a:xfrm>
-          <a:off x="0" y="0"/>
-          <a:ext cx="0" cy="0"/>
-          <a:chOff x="0" y="0"/>
-          <a:chExt cx="0" cy="0"/>
-        </a:xfrm>
-      </p:grpSpPr>
-      <p:sp>
-        <p:nvSpPr>
-          <p:cNvPr id="4" name="Titel 3"/>
-          <p:cNvSpPr>
-            <a:spLocks noGrp="1"/>
-          </p:cNvSpPr>
-          <p:nvPr>
-            <p:ph type="title" hasCustomPrompt="1"/>
-          </p:nvPr>
-        </p:nvSpPr>
-        <p:spPr bwMode="auto">
-          <a:xfrm>
-            <a:off x="1343025" y="152400"/>
-            <a:ext cx="10656888" cy="468314"/>
-          </a:xfrm>
-          <a:prstGeom prst="rect">
-            <a:avLst/>
-          </a:prstGeom>
-        </p:spPr>
-        <p:txBody>
-          <a:bodyPr lIns="0" tIns="0" rIns="0" bIns="0">
-            <a:normAutofit/>
-          </a:bodyPr>
-          <a:lstStyle>
-            <a:lvl1pPr>
-              <a:defRPr sz="2800"/>
-            </a:lvl1pPr>
-          </a:lstStyle>
-          <a:p>
-            <a:pPr>
-              <a:defRPr/>
-            </a:pPr>
-            <a:r>
-              <a:rPr lang="de-DE"/>
-              <a:t>Titelmasterformat durch Klicken bearbeiten</a:t>
-            </a:r>
-            <a:endParaRPr/>
-          </a:p>
-        </p:txBody>
-      </p:sp>
-      <p:sp>
-        <p:nvSpPr>
-          <p:cNvPr id="6" name="Bildplatzhalter 4"/>
-          <p:cNvSpPr>
-            <a:spLocks noGrp="1"/>
-          </p:cNvSpPr>
-          <p:nvPr>
-            <p:ph type="pic" sz="quarter" idx="12" hasCustomPrompt="1"/>
-          </p:nvPr>
-        </p:nvSpPr>
-        <p:spPr bwMode="auto">
-          <a:xfrm>
-            <a:off x="192088" y="908050"/>
-            <a:ext cx="790576" cy="928370"/>
-          </a:xfrm>
-          <a:prstGeom prst="rect">
-            <a:avLst/>
-          </a:prstGeom>
-        </p:spPr>
-        <p:txBody>
-          <a:bodyPr anchor="b">
-            <a:noAutofit/>
-          </a:bodyPr>
-          <a:lstStyle>
-            <a:lvl1pPr marL="0" indent="0" algn="ctr">
-              <a:buNone/>
-              <a:defRPr sz="2000">
-                <a:latin typeface="Roboto"/>
-                <a:ea typeface="Roboto"/>
-              </a:defRPr>
-            </a:lvl1pPr>
-          </a:lstStyle>
-          <a:p>
-            <a:pPr>
-              <a:defRPr/>
-            </a:pPr>
-            <a:r>
-              <a:rPr lang="de-DE"/>
-              <a:t>Logo</a:t>
-            </a:r>
-            <a:endParaRPr/>
-          </a:p>
-        </p:txBody>
-      </p:sp>
-      <p:sp>
-        <p:nvSpPr>
-          <p:cNvPr id="12" name="Textplatzhalter 7"/>
-          <p:cNvSpPr>
-            <a:spLocks noGrp="1"/>
-          </p:cNvSpPr>
-          <p:nvPr>
-            <p:ph type="body" sz="quarter" idx="13" hasCustomPrompt="1"/>
-          </p:nvPr>
-        </p:nvSpPr>
-        <p:spPr bwMode="auto">
-          <a:xfrm>
-            <a:off x="1558925" y="908050"/>
-            <a:ext cx="10440988" cy="928370"/>
-          </a:xfrm>
-          <a:prstGeom prst="rect">
-            <a:avLst/>
-          </a:prstGeom>
-        </p:spPr>
-        <p:txBody>
-          <a:bodyPr lIns="0" tIns="0" rIns="0" bIns="0">
-            <a:normAutofit/>
-          </a:bodyPr>
-          <a:lstStyle>
-            <a:lvl1pPr marL="0" indent="0">
-              <a:buFont typeface="Arial"/>
-              <a:buNone/>
-              <a:defRPr sz="2400" b="1">
-                <a:solidFill>
-                  <a:schemeClr val="tx1"/>
-                </a:solidFill>
-                <a:latin typeface="Roboto"/>
-                <a:ea typeface="Roboto"/>
-              </a:defRPr>
-            </a:lvl1pPr>
-            <a:lvl2pPr>
-              <a:defRPr sz="2400">
-                <a:latin typeface="Roboto"/>
-                <a:ea typeface="Roboto"/>
-              </a:defRPr>
-            </a:lvl2pPr>
-            <a:lvl3pPr>
-              <a:defRPr sz="2000">
-                <a:latin typeface="Roboto"/>
-                <a:ea typeface="Roboto"/>
-              </a:defRPr>
-            </a:lvl3pPr>
-            <a:lvl4pPr>
-              <a:defRPr sz="2000">
-                <a:latin typeface="Roboto"/>
-                <a:ea typeface="Roboto"/>
-              </a:defRPr>
-            </a:lvl4pPr>
-            <a:lvl5pPr>
-              <a:defRPr sz="2000">
-                <a:latin typeface="Roboto"/>
-                <a:ea typeface="Roboto"/>
-              </a:defRPr>
-            </a:lvl5pPr>
-          </a:lstStyle>
-          <a:p>
-            <a:pPr lvl="0">
-              <a:defRPr/>
-            </a:pPr>
-            <a:r>
-              <a:rPr lang="de-DE"/>
-              <a:t>Textmasterformat bearbeiten</a:t>
-            </a:r>
-            <a:endParaRPr/>
-          </a:p>
-        </p:txBody>
-      </p:sp>
-      <p:sp>
-        <p:nvSpPr>
-          <p:cNvPr id="8" name="Textplatzhalter 7"/>
-          <p:cNvSpPr>
-            <a:spLocks noGrp="1"/>
-          </p:cNvSpPr>
-          <p:nvPr>
-            <p:ph type="body" sz="quarter" idx="11"/>
-          </p:nvPr>
-        </p:nvSpPr>
-        <p:spPr bwMode="auto">
-          <a:xfrm>
-            <a:off x="1558925" y="1996440"/>
-            <a:ext cx="10440988" cy="4348798"/>
-          </a:xfrm>
-          <a:prstGeom prst="rect">
-            <a:avLst/>
-          </a:prstGeom>
-        </p:spPr>
-        <p:txBody>
-          <a:bodyPr>
-            <a:normAutofit/>
-          </a:bodyPr>
-          <a:lstStyle>
-            <a:lvl1pPr>
-              <a:defRPr sz="2800">
-                <a:latin typeface="Roboto"/>
-                <a:ea typeface="Roboto"/>
-              </a:defRPr>
-            </a:lvl1pPr>
-            <a:lvl2pPr>
-              <a:defRPr sz="2400">
                 <a:latin typeface="Roboto"/>
                 <a:ea typeface="Roboto"/>
               </a:defRPr>
@@ -6850,7 +7136,7 @@
           <p:nvPr userDrawn="1"/>
         </p:nvPicPr>
         <p:blipFill>
-          <a:blip r:embed="rId8"/>
+          <a:blip r:embed="rId9"/>
           <a:stretch/>
         </p:blipFill>
         <p:spPr bwMode="auto">
@@ -6873,6 +7159,7 @@
     <p:sldLayoutId id="2147483657" r:id="rId4"/>
     <p:sldLayoutId id="2147483658" r:id="rId5"/>
     <p:sldLayoutId id="2147483659" r:id="rId6"/>
+    <p:sldLayoutId id="2147483660" r:id="rId7"/>
   </p:sldLayoutIdLst>
   <p:txStyles>
     <p:titleStyle>
@@ -10774,16 +11061,12 @@
           </p:nvPr>
         </p:nvSpPr>
         <p:spPr bwMode="auto">
-          <a:xfrm flipH="0" flipV="0">
-            <a:off x="192087" y="1996439"/>
-            <a:ext cx="5613406" cy="4348797"/>
-          </a:xfrm>
           <a:prstGeom prst="rect">
             <a:avLst/>
           </a:prstGeom>
         </p:spPr>
         <p:txBody>
-          <a:bodyPr>
+          <a:bodyPr vertOverflow="overflow" horzOverflow="overflow" vert="horz" wrap="square" lIns="91440" tIns="45720" rIns="91440" bIns="45720" numCol="1" spcCol="0" rtlCol="0" fromWordArt="0" anchor="ctr" anchorCtr="0" forceAA="0" upright="0" compatLnSpc="0">
             <a:normAutofit/>
           </a:bodyPr>
           <a:lstStyle>
@@ -10945,20 +11228,22 @@
       </p:sp>
       <p:pic>
         <p:nvPicPr>
-          <p:cNvPr id="96713651" name=""/>
+          <p:cNvPr id="835187005" name=""/>
           <p:cNvPicPr>
             <a:picLocks noChangeAspect="1"/>
           </p:cNvPicPr>
-          <p:nvPr/>
+          <p:nvPr>
+            <p:ph type="pic" sz="quarter" idx="10"/>
+          </p:nvPr>
         </p:nvPicPr>
         <p:blipFill>
           <a:blip r:embed="rId3"/>
           <a:stretch/>
         </p:blipFill>
         <p:spPr bwMode="auto">
-          <a:xfrm rot="0" flipH="0" flipV="0">
-            <a:off x="5805495" y="1996438"/>
-            <a:ext cx="5811394" cy="3376400"/>
+          <a:xfrm rot="0">
+            <a:off x="6203949" y="2519188"/>
+            <a:ext cx="5795961" cy="3367435"/>
           </a:xfrm>
           <a:prstGeom prst="rect">
             <a:avLst/>

</xml_diff>

<commit_message>
final version - 1.0 (Note)
</commit_message>
<xml_diff>
--- a/defense/praktikum_defense.pptx
+++ b/defense/praktikum_defense.pptx
@@ -7718,7 +7718,7 @@
         </p:blipFill>
         <p:spPr bwMode="auto">
           <a:xfrm flipH="0" flipV="0">
-            <a:off x="9160178" y="-794"/>
+            <a:off x="9160178" y="-793"/>
             <a:ext cx="2731782" cy="1506497"/>
           </a:xfrm>
           <a:prstGeom prst="rect">
@@ -8633,7 +8633,7 @@
         <p:spPr bwMode="auto">
           <a:xfrm flipH="0" flipV="0">
             <a:off x="7405463" y="3485482"/>
-            <a:ext cx="3290474" cy="2859753"/>
+            <a:ext cx="3290473" cy="2859753"/>
           </a:xfrm>
           <a:prstGeom prst="rect">
             <a:avLst/>
@@ -8774,7 +8774,7 @@
         </p:nvSpPr>
         <p:spPr bwMode="auto">
           <a:xfrm flipH="0" flipV="0">
-            <a:off x="10284444" y="6040075"/>
+            <a:off x="10284443" y="6040075"/>
             <a:ext cx="412212" cy="305159"/>
           </a:xfrm>
           <a:prstGeom prst="rect">
@@ -9447,7 +9447,7 @@
                       </a:endParaRPr>
                     </a:p>
                     <a:p>
-                      <a:pPr marL="206778" marR="0" lvl="0" indent="-206778" algn="l" defTabSz="863993">
+                      <a:pPr marL="206777" marR="0" lvl="0" indent="-206777" algn="l" defTabSz="863992">
                         <a:lnSpc>
                           <a:spcPct val="100000"/>
                         </a:lnSpc>
@@ -10019,7 +10019,7 @@
         </p:blipFill>
         <p:spPr bwMode="auto">
           <a:xfrm flipH="0" flipV="0">
-            <a:off x="6856387" y="908048"/>
+            <a:off x="6856386" y="908048"/>
             <a:ext cx="5143523" cy="3325812"/>
           </a:xfrm>
           <a:prstGeom prst="rect">
@@ -10259,7 +10259,7 @@
         </p:blipFill>
         <p:spPr bwMode="auto">
           <a:xfrm flipH="0" flipV="0">
-            <a:off x="1029910" y="3854252"/>
+            <a:off x="1029909" y="3854252"/>
             <a:ext cx="5066089" cy="2533044"/>
           </a:xfrm>
           <a:prstGeom prst="rect">
@@ -10281,7 +10281,7 @@
         </p:blipFill>
         <p:spPr bwMode="auto">
           <a:xfrm flipH="0" flipV="0">
-            <a:off x="1029910" y="1321207"/>
+            <a:off x="1029909" y="1321207"/>
             <a:ext cx="5066089" cy="2533044"/>
           </a:xfrm>
           <a:prstGeom prst="rect">
@@ -13556,7 +13556,7 @@
         </p:blipFill>
         <p:spPr bwMode="auto">
           <a:xfrm flipH="0" flipV="0">
-            <a:off x="10087165" y="3042542"/>
+            <a:off x="10087165" y="3042541"/>
             <a:ext cx="1912745" cy="938242"/>
           </a:xfrm>
           <a:prstGeom prst="rect">
@@ -13992,7 +13992,7 @@
         </p:nvSpPr>
         <p:spPr bwMode="auto">
           <a:xfrm flipH="0" flipV="0">
-            <a:off x="2297509" y="4007181"/>
+            <a:off x="2297509" y="4007180"/>
             <a:ext cx="970627" cy="292967"/>
           </a:xfrm>
           <a:prstGeom prst="rect">
@@ -14049,7 +14049,7 @@
         </p:nvSpPr>
         <p:spPr bwMode="auto">
           <a:xfrm rot="0" flipH="0" flipV="0">
-            <a:off x="844014" y="2692391"/>
+            <a:off x="844013" y="2692391"/>
             <a:ext cx="1728191" cy="752190"/>
           </a:xfrm>
           <a:prstGeom prst="rect">
@@ -14444,7 +14444,7 @@
         </p:nvSpPr>
         <p:spPr bwMode="auto">
           <a:xfrm>
-            <a:off x="205767" y="5257501"/>
+            <a:off x="205767" y="5257500"/>
             <a:ext cx="6552727" cy="1071885"/>
           </a:xfrm>
           <a:prstGeom prst="rect">
@@ -17482,7 +17482,7 @@
           </p:nvSpPr>
           <p:spPr bwMode="auto">
             <a:xfrm flipH="0" flipV="0">
-              <a:off x="956255" y="958439"/>
+              <a:off x="956255" y="958438"/>
               <a:ext cx="2738202" cy="686160"/>
             </a:xfrm>
             <a:prstGeom prst="rect">
@@ -17978,24 +17978,14 @@
                 <a:ea typeface="Roboto"/>
                 <a:cs typeface="Roboto"/>
               </a:rPr>
-              <a:t>Prozess </a:t>
-            </a:r>
-            <a:r>
-              <a:rPr lang="de-DE" sz="2000" b="0" i="0" u="none" strike="noStrike" cap="none" spc="0">
-                <a:solidFill>
-                  <a:schemeClr val="tx1"/>
-                </a:solidFill>
-                <a:latin typeface="Roboto"/>
-                <a:ea typeface="Roboto"/>
-                <a:cs typeface="Roboto"/>
-              </a:rPr>
-              <a:t>zum Entwickeln, Testen und verteilen von Software</a:t>
+              <a:t>fortlaufendes Zusammenfügen von Teilkomponenten einer zu einer vollständigen Software</a:t>
             </a:r>
             <a:endParaRPr lang="de-DE" sz="2000" b="0" i="0" u="none" strike="noStrike" cap="none" spc="0">
               <a:solidFill>
                 <a:schemeClr val="tx1"/>
               </a:solidFill>
               <a:latin typeface="Roboto"/>
+              <a:ea typeface="Roboto"/>
               <a:cs typeface="Roboto"/>
             </a:endParaRPr>
           </a:p>

</xml_diff>